<commit_message>
Starting Issue 754 [Wrong image used in features.html] Update Issue 754 Updated the image.
</commit_message>
<xml_diff>
--- a/doc/mockups/features-screenshots/feature2-enroll.pptx
+++ b/doc/mockups/features-screenshots/feature2-enroll.pptx
@@ -298,7 +298,7 @@
             <a:fld id="{B0544CA6-0BFF-4F49-885A-88A3CCAE5331}" type="datetimeFigureOut">
               <a:rPr lang="en-SG" smtClean="0"/>
               <a:pPr/>
-              <a:t>20/3/2013</a:t>
+              <a:t>1/4/2013</a:t>
             </a:fld>
             <a:endParaRPr lang="en-SG"/>
           </a:p>
@@ -465,7 +465,7 @@
             <a:fld id="{B0544CA6-0BFF-4F49-885A-88A3CCAE5331}" type="datetimeFigureOut">
               <a:rPr lang="en-SG" smtClean="0"/>
               <a:pPr/>
-              <a:t>20/3/2013</a:t>
+              <a:t>1/4/2013</a:t>
             </a:fld>
             <a:endParaRPr lang="en-SG"/>
           </a:p>
@@ -642,7 +642,7 @@
             <a:fld id="{B0544CA6-0BFF-4F49-885A-88A3CCAE5331}" type="datetimeFigureOut">
               <a:rPr lang="en-SG" smtClean="0"/>
               <a:pPr/>
-              <a:t>20/3/2013</a:t>
+              <a:t>1/4/2013</a:t>
             </a:fld>
             <a:endParaRPr lang="en-SG"/>
           </a:p>
@@ -809,7 +809,7 @@
             <a:fld id="{B0544CA6-0BFF-4F49-885A-88A3CCAE5331}" type="datetimeFigureOut">
               <a:rPr lang="en-SG" smtClean="0"/>
               <a:pPr/>
-              <a:t>20/3/2013</a:t>
+              <a:t>1/4/2013</a:t>
             </a:fld>
             <a:endParaRPr lang="en-SG"/>
           </a:p>
@@ -1052,7 +1052,7 @@
             <a:fld id="{B0544CA6-0BFF-4F49-885A-88A3CCAE5331}" type="datetimeFigureOut">
               <a:rPr lang="en-SG" smtClean="0"/>
               <a:pPr/>
-              <a:t>20/3/2013</a:t>
+              <a:t>1/4/2013</a:t>
             </a:fld>
             <a:endParaRPr lang="en-SG"/>
           </a:p>
@@ -1337,7 +1337,7 @@
             <a:fld id="{B0544CA6-0BFF-4F49-885A-88A3CCAE5331}" type="datetimeFigureOut">
               <a:rPr lang="en-SG" smtClean="0"/>
               <a:pPr/>
-              <a:t>20/3/2013</a:t>
+              <a:t>1/4/2013</a:t>
             </a:fld>
             <a:endParaRPr lang="en-SG"/>
           </a:p>
@@ -1756,7 +1756,7 @@
             <a:fld id="{B0544CA6-0BFF-4F49-885A-88A3CCAE5331}" type="datetimeFigureOut">
               <a:rPr lang="en-SG" smtClean="0"/>
               <a:pPr/>
-              <a:t>20/3/2013</a:t>
+              <a:t>1/4/2013</a:t>
             </a:fld>
             <a:endParaRPr lang="en-SG"/>
           </a:p>
@@ -1871,7 +1871,7 @@
             <a:fld id="{B0544CA6-0BFF-4F49-885A-88A3CCAE5331}" type="datetimeFigureOut">
               <a:rPr lang="en-SG" smtClean="0"/>
               <a:pPr/>
-              <a:t>20/3/2013</a:t>
+              <a:t>1/4/2013</a:t>
             </a:fld>
             <a:endParaRPr lang="en-SG"/>
           </a:p>
@@ -1963,7 +1963,7 @@
             <a:fld id="{B0544CA6-0BFF-4F49-885A-88A3CCAE5331}" type="datetimeFigureOut">
               <a:rPr lang="en-SG" smtClean="0"/>
               <a:pPr/>
-              <a:t>20/3/2013</a:t>
+              <a:t>1/4/2013</a:t>
             </a:fld>
             <a:endParaRPr lang="en-SG"/>
           </a:p>
@@ -2237,7 +2237,7 @@
             <a:fld id="{B0544CA6-0BFF-4F49-885A-88A3CCAE5331}" type="datetimeFigureOut">
               <a:rPr lang="en-SG" smtClean="0"/>
               <a:pPr/>
-              <a:t>20/3/2013</a:t>
+              <a:t>1/4/2013</a:t>
             </a:fld>
             <a:endParaRPr lang="en-SG"/>
           </a:p>
@@ -2487,7 +2487,7 @@
             <a:fld id="{B0544CA6-0BFF-4F49-885A-88A3CCAE5331}" type="datetimeFigureOut">
               <a:rPr lang="en-SG" smtClean="0"/>
               <a:pPr/>
-              <a:t>20/3/2013</a:t>
+              <a:t>1/4/2013</a:t>
             </a:fld>
             <a:endParaRPr lang="en-SG"/>
           </a:p>
@@ -2697,7 +2697,7 @@
             <a:fld id="{B0544CA6-0BFF-4F49-885A-88A3CCAE5331}" type="datetimeFigureOut">
               <a:rPr lang="en-SG" smtClean="0"/>
               <a:pPr/>
-              <a:t>20/3/2013</a:t>
+              <a:t>1/4/2013</a:t>
             </a:fld>
             <a:endParaRPr lang="en-SG"/>
           </a:p>
@@ -3279,82 +3279,6 @@
           </a:p>
         </p:txBody>
       </p:sp>
-      <p:sp>
-        <p:nvSpPr>
-          <p:cNvPr id="35" name="Curved Left Arrow 34"/>
-          <p:cNvSpPr/>
-          <p:nvPr/>
-        </p:nvSpPr>
-        <p:spPr>
-          <a:xfrm rot="8593321">
-            <a:off x="3844945" y="1329586"/>
-            <a:ext cx="249528" cy="419340"/>
-          </a:xfrm>
-          <a:prstGeom prst="curvedLeftArrow">
-            <a:avLst/>
-          </a:prstGeom>
-          <a:ln w="12700"/>
-        </p:spPr>
-        <p:style>
-          <a:lnRef idx="2">
-            <a:schemeClr val="accent1">
-              <a:shade val="50000"/>
-            </a:schemeClr>
-          </a:lnRef>
-          <a:fillRef idx="1">
-            <a:schemeClr val="accent1"/>
-          </a:fillRef>
-          <a:effectRef idx="0">
-            <a:schemeClr val="accent1"/>
-          </a:effectRef>
-          <a:fontRef idx="minor">
-            <a:schemeClr val="lt1"/>
-          </a:fontRef>
-        </p:style>
-        <p:txBody>
-          <a:bodyPr lIns="79708" tIns="39854" rIns="79708" bIns="39854" rtlCol="0" anchor="ctr"/>
-          <a:lstStyle/>
-          <a:p>
-            <a:pPr algn="ctr"/>
-            <a:endParaRPr lang="en-SG">
-              <a:solidFill>
-                <a:schemeClr val="tx1"/>
-              </a:solidFill>
-            </a:endParaRPr>
-          </a:p>
-        </p:txBody>
-      </p:sp>
-      <p:pic>
-        <p:nvPicPr>
-          <p:cNvPr id="36" name="Picture 35" descr="enroll students.png"/>
-          <p:cNvPicPr>
-            <a:picLocks noChangeAspect="1"/>
-          </p:cNvPicPr>
-          <p:nvPr/>
-        </p:nvPicPr>
-        <p:blipFill>
-          <a:blip r:embed="rId3" cstate="print"/>
-          <a:stretch>
-            <a:fillRect/>
-          </a:stretch>
-        </p:blipFill>
-        <p:spPr>
-          <a:xfrm>
-            <a:off x="4104828" y="1227583"/>
-            <a:ext cx="3596938" cy="1208665"/>
-          </a:xfrm>
-          <a:prstGeom prst="rect">
-            <a:avLst/>
-          </a:prstGeom>
-          <a:ln>
-            <a:solidFill>
-              <a:schemeClr val="bg1">
-                <a:lumMod val="85000"/>
-              </a:schemeClr>
-            </a:solidFill>
-          </a:ln>
-        </p:spPr>
-      </p:pic>
       <p:grpSp>
         <p:nvGrpSpPr>
           <p:cNvPr id="10" name="Group 9"/>
@@ -3726,6 +3650,128 @@
           </p:txBody>
         </p:sp>
       </p:grpSp>
+      <p:pic>
+        <p:nvPicPr>
+          <p:cNvPr id="1028" name="Picture 4"/>
+          <p:cNvPicPr>
+            <a:picLocks noChangeAspect="1" noChangeArrowheads="1"/>
+          </p:cNvPicPr>
+          <p:nvPr/>
+        </p:nvPicPr>
+        <p:blipFill>
+          <a:blip r:embed="rId3">
+            <a:extLst>
+              <a:ext uri="{28A0092B-C50C-407E-A947-70E740481C1C}">
+                <a14:useLocalDpi xmlns:a14="http://schemas.microsoft.com/office/drawing/2010/main" val="0"/>
+              </a:ext>
+            </a:extLst>
+          </a:blip>
+          <a:srcRect/>
+          <a:stretch>
+            <a:fillRect/>
+          </a:stretch>
+        </p:blipFill>
+        <p:spPr bwMode="auto">
+          <a:xfrm>
+            <a:off x="4104828" y="1011378"/>
+            <a:ext cx="2976388" cy="1378378"/>
+          </a:xfrm>
+          <a:prstGeom prst="rect">
+            <a:avLst/>
+          </a:prstGeom>
+          <a:noFill/>
+          <a:ln w="9525">
+            <a:solidFill>
+              <a:schemeClr val="bg1">
+                <a:lumMod val="85000"/>
+              </a:schemeClr>
+            </a:solidFill>
+            <a:miter lim="800000"/>
+            <a:headEnd/>
+            <a:tailEnd/>
+          </a:ln>
+          <a:effectLst>
+            <a:outerShdw blurRad="63500" sx="102000" sy="102000" algn="ctr" rotWithShape="0">
+              <a:prstClr val="black">
+                <a:alpha val="40000"/>
+              </a:prstClr>
+            </a:outerShdw>
+          </a:effectLst>
+          <a:extLst>
+            <a:ext uri="{909E8E84-426E-40DD-AFC4-6F175D3DCCD1}">
+              <a14:hiddenFill xmlns:a14="http://schemas.microsoft.com/office/drawing/2010/main">
+                <a:solidFill>
+                  <a:schemeClr val="accent1"/>
+                </a:solidFill>
+              </a14:hiddenFill>
+            </a:ext>
+            <a:ext uri="{91240B29-F687-4F45-9708-019B960494DF}">
+              <a14:hiddenLine xmlns:a14="http://schemas.microsoft.com/office/drawing/2010/main" w="9525">
+                <a:solidFill>
+                  <a:schemeClr val="tx1"/>
+                </a:solidFill>
+                <a:miter lim="800000"/>
+                <a:headEnd/>
+                <a:tailEnd/>
+              </a14:hiddenLine>
+            </a:ext>
+            <a:ext uri="{AF507438-7753-43E0-B8FC-AC1667EBCBE1}">
+              <a14:hiddenEffects xmlns:a14="http://schemas.microsoft.com/office/drawing/2010/main">
+                <a:effectLst>
+                  <a:outerShdw dist="35921" dir="2700000" algn="ctr" rotWithShape="0">
+                    <a:schemeClr val="bg2"/>
+                  </a:outerShdw>
+                </a:effectLst>
+              </a14:hiddenEffects>
+            </a:ext>
+          </a:extLst>
+        </p:spPr>
+      </p:pic>
+      <p:sp>
+        <p:nvSpPr>
+          <p:cNvPr id="35" name="Curved Left Arrow 34"/>
+          <p:cNvSpPr/>
+          <p:nvPr/>
+        </p:nvSpPr>
+        <p:spPr>
+          <a:xfrm rot="8593321">
+            <a:off x="3844945" y="1329586"/>
+            <a:ext cx="249528" cy="419340"/>
+          </a:xfrm>
+          <a:prstGeom prst="curvedLeftArrow">
+            <a:avLst/>
+          </a:prstGeom>
+          <a:ln w="12700"/>
+        </p:spPr>
+        <p:style>
+          <a:lnRef idx="2">
+            <a:schemeClr val="accent1">
+              <a:shade val="50000"/>
+            </a:schemeClr>
+          </a:lnRef>
+          <a:fillRef idx="1">
+            <a:schemeClr val="accent1"/>
+          </a:fillRef>
+          <a:effectRef idx="0">
+            <a:schemeClr val="accent1"/>
+          </a:effectRef>
+          <a:fontRef idx="minor">
+            <a:schemeClr val="lt1"/>
+          </a:fontRef>
+        </p:style>
+        <p:txBody>
+          <a:bodyPr lIns="79708" tIns="39854" rIns="79708" bIns="39854" rtlCol="0" anchor="ctr"/>
+          <a:lstStyle/>
+          <a:p>
+            <a:pPr algn="ctr"/>
+            <a:endParaRPr lang="en-SG">
+              <a:solidFill>
+                <a:schemeClr val="tx1"/>
+              </a:solidFill>
+            </a:endParaRPr>
+          </a:p>
+        </p:txBody>
+      </p:sp>
     </p:spTree>
   </p:cSld>
   <p:clrMapOvr>

</xml_diff>

<commit_message>
Issue 1457: Update features.html to match V4.80 Update Issue 1457
</commit_message>
<xml_diff>
--- a/doc/mockups/features-screenshots/feature2-enroll.pptx
+++ b/doc/mockups/features-screenshots/feature2-enroll.pptx
@@ -7,7 +7,7 @@
   <p:sldIdLst>
     <p:sldId id="261" r:id="rId2"/>
   </p:sldIdLst>
-  <p:sldSz cx="7921625" cy="2520950"/>
+  <p:sldSz cx="7921625" cy="2339975"/>
   <p:notesSz cx="6858000" cy="9144000"/>
   <p:custDataLst>
     <p:tags r:id="rId3"/>
@@ -145,8 +145,8 @@
         </p:nvSpPr>
         <p:spPr>
           <a:xfrm>
-            <a:off x="594125" y="783130"/>
-            <a:ext cx="6733381" cy="540370"/>
+            <a:off x="594126" y="726910"/>
+            <a:ext cx="6733381" cy="501578"/>
           </a:xfrm>
         </p:spPr>
         <p:txBody>
@@ -173,8 +173,8 @@
         </p:nvSpPr>
         <p:spPr>
           <a:xfrm>
-            <a:off x="1188244" y="1428539"/>
-            <a:ext cx="5545138" cy="644243"/>
+            <a:off x="1188244" y="1325987"/>
+            <a:ext cx="5545138" cy="597994"/>
           </a:xfrm>
         </p:spPr>
         <p:txBody>
@@ -298,7 +298,7 @@
             <a:fld id="{B0544CA6-0BFF-4F49-885A-88A3CCAE5331}" type="datetimeFigureOut">
               <a:rPr lang="en-SG" smtClean="0"/>
               <a:pPr/>
-              <a:t>1/4/2013</a:t>
+              <a:t>25/1/2014</a:t>
             </a:fld>
             <a:endParaRPr lang="en-SG"/>
           </a:p>
@@ -465,7 +465,7 @@
             <a:fld id="{B0544CA6-0BFF-4F49-885A-88A3CCAE5331}" type="datetimeFigureOut">
               <a:rPr lang="en-SG" smtClean="0"/>
               <a:pPr/>
-              <a:t>1/4/2013</a:t>
+              <a:t>25/1/2014</a:t>
             </a:fld>
             <a:endParaRPr lang="en-SG"/>
           </a:p>
@@ -551,8 +551,8 @@
         </p:nvSpPr>
         <p:spPr>
           <a:xfrm>
-            <a:off x="5743180" y="100956"/>
-            <a:ext cx="1782367" cy="2150977"/>
+            <a:off x="5743181" y="93709"/>
+            <a:ext cx="1782367" cy="1996562"/>
           </a:xfrm>
         </p:spPr>
         <p:txBody>
@@ -579,8 +579,8 @@
         </p:nvSpPr>
         <p:spPr>
           <a:xfrm>
-            <a:off x="396085" y="100956"/>
-            <a:ext cx="5215069" cy="2150977"/>
+            <a:off x="396086" y="93709"/>
+            <a:ext cx="5215069" cy="1996562"/>
           </a:xfrm>
         </p:spPr>
         <p:txBody>
@@ -642,7 +642,7 @@
             <a:fld id="{B0544CA6-0BFF-4F49-885A-88A3CCAE5331}" type="datetimeFigureOut">
               <a:rPr lang="en-SG" smtClean="0"/>
               <a:pPr/>
-              <a:t>1/4/2013</a:t>
+              <a:t>25/1/2014</a:t>
             </a:fld>
             <a:endParaRPr lang="en-SG"/>
           </a:p>
@@ -809,7 +809,7 @@
             <a:fld id="{B0544CA6-0BFF-4F49-885A-88A3CCAE5331}" type="datetimeFigureOut">
               <a:rPr lang="en-SG" smtClean="0"/>
               <a:pPr/>
-              <a:t>1/4/2013</a:t>
+              <a:t>25/1/2014</a:t>
             </a:fld>
             <a:endParaRPr lang="en-SG"/>
           </a:p>
@@ -895,8 +895,8 @@
         </p:nvSpPr>
         <p:spPr>
           <a:xfrm>
-            <a:off x="625757" y="1619945"/>
-            <a:ext cx="6733381" cy="500689"/>
+            <a:off x="625758" y="1503652"/>
+            <a:ext cx="6733381" cy="464745"/>
           </a:xfrm>
         </p:spPr>
         <p:txBody>
@@ -927,8 +927,8 @@
         </p:nvSpPr>
         <p:spPr>
           <a:xfrm>
-            <a:off x="625757" y="1068488"/>
-            <a:ext cx="6733381" cy="551457"/>
+            <a:off x="625758" y="991783"/>
+            <a:ext cx="6733381" cy="511869"/>
           </a:xfrm>
         </p:spPr>
         <p:txBody>
@@ -1052,7 +1052,7 @@
             <a:fld id="{B0544CA6-0BFF-4F49-885A-88A3CCAE5331}" type="datetimeFigureOut">
               <a:rPr lang="en-SG" smtClean="0"/>
               <a:pPr/>
-              <a:t>1/4/2013</a:t>
+              <a:t>25/1/2014</a:t>
             </a:fld>
             <a:endParaRPr lang="en-SG"/>
           </a:p>
@@ -1161,8 +1161,8 @@
         </p:nvSpPr>
         <p:spPr>
           <a:xfrm>
-            <a:off x="396082" y="588223"/>
-            <a:ext cx="3498718" cy="1663711"/>
+            <a:off x="396082" y="545996"/>
+            <a:ext cx="3498718" cy="1544276"/>
           </a:xfrm>
         </p:spPr>
         <p:txBody>
@@ -1246,8 +1246,8 @@
         </p:nvSpPr>
         <p:spPr>
           <a:xfrm>
-            <a:off x="4026827" y="588223"/>
-            <a:ext cx="3498718" cy="1663711"/>
+            <a:off x="4026827" y="545996"/>
+            <a:ext cx="3498718" cy="1544276"/>
           </a:xfrm>
         </p:spPr>
         <p:txBody>
@@ -1337,7 +1337,7 @@
             <a:fld id="{B0544CA6-0BFF-4F49-885A-88A3CCAE5331}" type="datetimeFigureOut">
               <a:rPr lang="en-SG" smtClean="0"/>
               <a:pPr/>
-              <a:t>1/4/2013</a:t>
+              <a:t>25/1/2014</a:t>
             </a:fld>
             <a:endParaRPr lang="en-SG"/>
           </a:p>
@@ -1450,8 +1450,8 @@
         </p:nvSpPr>
         <p:spPr>
           <a:xfrm>
-            <a:off x="396083" y="564296"/>
-            <a:ext cx="3500094" cy="235172"/>
+            <a:off x="396083" y="523786"/>
+            <a:ext cx="3500094" cy="218289"/>
           </a:xfrm>
         </p:spPr>
         <p:txBody>
@@ -1515,8 +1515,8 @@
         </p:nvSpPr>
         <p:spPr>
           <a:xfrm>
-            <a:off x="396083" y="799469"/>
-            <a:ext cx="3500094" cy="1452464"/>
+            <a:off x="396083" y="742076"/>
+            <a:ext cx="3500094" cy="1348194"/>
           </a:xfrm>
         </p:spPr>
         <p:txBody>
@@ -1600,8 +1600,8 @@
         </p:nvSpPr>
         <p:spPr>
           <a:xfrm>
-            <a:off x="4024077" y="564296"/>
-            <a:ext cx="3501468" cy="235172"/>
+            <a:off x="4024077" y="523786"/>
+            <a:ext cx="3501468" cy="218289"/>
           </a:xfrm>
         </p:spPr>
         <p:txBody>
@@ -1665,8 +1665,8 @@
         </p:nvSpPr>
         <p:spPr>
           <a:xfrm>
-            <a:off x="4024077" y="799469"/>
-            <a:ext cx="3501468" cy="1452464"/>
+            <a:off x="4024077" y="742076"/>
+            <a:ext cx="3501468" cy="1348194"/>
           </a:xfrm>
         </p:spPr>
         <p:txBody>
@@ -1756,7 +1756,7 @@
             <a:fld id="{B0544CA6-0BFF-4F49-885A-88A3CCAE5331}" type="datetimeFigureOut">
               <a:rPr lang="en-SG" smtClean="0"/>
               <a:pPr/>
-              <a:t>1/4/2013</a:t>
+              <a:t>25/1/2014</a:t>
             </a:fld>
             <a:endParaRPr lang="en-SG"/>
           </a:p>
@@ -1871,7 +1871,7 @@
             <a:fld id="{B0544CA6-0BFF-4F49-885A-88A3CCAE5331}" type="datetimeFigureOut">
               <a:rPr lang="en-SG" smtClean="0"/>
               <a:pPr/>
-              <a:t>1/4/2013</a:t>
+              <a:t>25/1/2014</a:t>
             </a:fld>
             <a:endParaRPr lang="en-SG"/>
           </a:p>
@@ -1963,7 +1963,7 @@
             <a:fld id="{B0544CA6-0BFF-4F49-885A-88A3CCAE5331}" type="datetimeFigureOut">
               <a:rPr lang="en-SG" smtClean="0"/>
               <a:pPr/>
-              <a:t>1/4/2013</a:t>
+              <a:t>25/1/2014</a:t>
             </a:fld>
             <a:endParaRPr lang="en-SG"/>
           </a:p>
@@ -2049,8 +2049,8 @@
         </p:nvSpPr>
         <p:spPr>
           <a:xfrm>
-            <a:off x="396085" y="100373"/>
-            <a:ext cx="2606160" cy="427161"/>
+            <a:off x="396085" y="93168"/>
+            <a:ext cx="2606160" cy="396496"/>
           </a:xfrm>
         </p:spPr>
         <p:txBody>
@@ -2081,8 +2081,8 @@
         </p:nvSpPr>
         <p:spPr>
           <a:xfrm>
-            <a:off x="3097136" y="100373"/>
-            <a:ext cx="4428408" cy="2151561"/>
+            <a:off x="3097136" y="93168"/>
+            <a:ext cx="4428408" cy="1997104"/>
           </a:xfrm>
         </p:spPr>
         <p:txBody>
@@ -2166,8 +2166,8 @@
         </p:nvSpPr>
         <p:spPr>
           <a:xfrm>
-            <a:off x="396085" y="527533"/>
-            <a:ext cx="2606160" cy="1724400"/>
+            <a:off x="396085" y="489662"/>
+            <a:ext cx="2606160" cy="1600608"/>
           </a:xfrm>
         </p:spPr>
         <p:txBody>
@@ -2237,7 +2237,7 @@
             <a:fld id="{B0544CA6-0BFF-4F49-885A-88A3CCAE5331}" type="datetimeFigureOut">
               <a:rPr lang="en-SG" smtClean="0"/>
               <a:pPr/>
-              <a:t>1/4/2013</a:t>
+              <a:t>25/1/2014</a:t>
             </a:fld>
             <a:endParaRPr lang="en-SG"/>
           </a:p>
@@ -2323,8 +2323,8 @@
         </p:nvSpPr>
         <p:spPr>
           <a:xfrm>
-            <a:off x="1552694" y="1764665"/>
-            <a:ext cx="4752975" cy="208329"/>
+            <a:off x="1552695" y="1637983"/>
+            <a:ext cx="4752975" cy="193373"/>
           </a:xfrm>
         </p:spPr>
         <p:txBody>
@@ -2355,8 +2355,8 @@
         </p:nvSpPr>
         <p:spPr>
           <a:xfrm>
-            <a:off x="1552694" y="225252"/>
-            <a:ext cx="4752975" cy="1512570"/>
+            <a:off x="1552695" y="209082"/>
+            <a:ext cx="4752975" cy="1403985"/>
           </a:xfrm>
         </p:spPr>
         <p:txBody>
@@ -2416,8 +2416,8 @@
         </p:nvSpPr>
         <p:spPr>
           <a:xfrm>
-            <a:off x="1552694" y="1972995"/>
-            <a:ext cx="4752975" cy="295861"/>
+            <a:off x="1552695" y="1831357"/>
+            <a:ext cx="4752975" cy="274622"/>
           </a:xfrm>
         </p:spPr>
         <p:txBody>
@@ -2487,7 +2487,7 @@
             <a:fld id="{B0544CA6-0BFF-4F49-885A-88A3CCAE5331}" type="datetimeFigureOut">
               <a:rPr lang="en-SG" smtClean="0"/>
               <a:pPr/>
-              <a:t>1/4/2013</a:t>
+              <a:t>25/1/2014</a:t>
             </a:fld>
             <a:endParaRPr lang="en-SG"/>
           </a:p>
@@ -2578,8 +2578,8 @@
         </p:nvSpPr>
         <p:spPr>
           <a:xfrm>
-            <a:off x="396083" y="100955"/>
-            <a:ext cx="7129463" cy="420159"/>
+            <a:off x="396084" y="93708"/>
+            <a:ext cx="7129463" cy="389996"/>
           </a:xfrm>
           <a:prstGeom prst="rect">
             <a:avLst/>
@@ -2611,8 +2611,8 @@
         </p:nvSpPr>
         <p:spPr>
           <a:xfrm>
-            <a:off x="396083" y="588223"/>
-            <a:ext cx="7129463" cy="1663711"/>
+            <a:off x="396084" y="545996"/>
+            <a:ext cx="7129463" cy="1544276"/>
           </a:xfrm>
           <a:prstGeom prst="rect">
             <a:avLst/>
@@ -2673,8 +2673,8 @@
         </p:nvSpPr>
         <p:spPr>
           <a:xfrm>
-            <a:off x="396083" y="2336547"/>
-            <a:ext cx="1848379" cy="134217"/>
+            <a:off x="396084" y="2168810"/>
+            <a:ext cx="1848379" cy="124582"/>
           </a:xfrm>
           <a:prstGeom prst="rect">
             <a:avLst/>
@@ -2697,7 +2697,7 @@
             <a:fld id="{B0544CA6-0BFF-4F49-885A-88A3CCAE5331}" type="datetimeFigureOut">
               <a:rPr lang="en-SG" smtClean="0"/>
               <a:pPr/>
-              <a:t>1/4/2013</a:t>
+              <a:t>25/1/2014</a:t>
             </a:fld>
             <a:endParaRPr lang="en-SG"/>
           </a:p>
@@ -2715,8 +2715,8 @@
         </p:nvSpPr>
         <p:spPr>
           <a:xfrm>
-            <a:off x="2706559" y="2336547"/>
-            <a:ext cx="2508515" cy="134217"/>
+            <a:off x="2706560" y="2168810"/>
+            <a:ext cx="2508515" cy="124582"/>
           </a:xfrm>
           <a:prstGeom prst="rect">
             <a:avLst/>
@@ -2752,8 +2752,8 @@
         </p:nvSpPr>
         <p:spPr>
           <a:xfrm>
-            <a:off x="5677168" y="2336547"/>
-            <a:ext cx="1848379" cy="134217"/>
+            <a:off x="5677169" y="2168810"/>
+            <a:ext cx="1848379" cy="124582"/>
           </a:xfrm>
           <a:prstGeom prst="rect">
             <a:avLst/>
@@ -3068,47 +3068,15 @@
           <a:chExt cx="0" cy="0"/>
         </a:xfrm>
       </p:grpSpPr>
-      <p:pic>
-        <p:nvPicPr>
-          <p:cNvPr id="1026" name="Picture 2"/>
-          <p:cNvPicPr>
-            <a:picLocks noChangeAspect="1" noChangeArrowheads="1"/>
-          </p:cNvPicPr>
-          <p:nvPr/>
-        </p:nvPicPr>
-        <p:blipFill>
-          <a:blip r:embed="rId2" cstate="print"/>
-          <a:srcRect/>
-          <a:stretch>
-            <a:fillRect/>
-          </a:stretch>
-        </p:blipFill>
-        <p:spPr bwMode="auto">
-          <a:xfrm>
-            <a:off x="2520653" y="324371"/>
-            <a:ext cx="4997272" cy="1296144"/>
-          </a:xfrm>
-          <a:prstGeom prst="rect">
-            <a:avLst/>
-          </a:prstGeom>
-          <a:noFill/>
-          <a:ln w="9525">
-            <a:noFill/>
-            <a:miter lim="800000"/>
-            <a:headEnd/>
-            <a:tailEnd/>
-          </a:ln>
-        </p:spPr>
-      </p:pic>
       <p:cxnSp>
         <p:nvCxnSpPr>
-          <p:cNvPr id="30" name="Straight Arrow Connector 29"/>
+          <p:cNvPr id="22" name="Straight Arrow Connector 21"/>
           <p:cNvCxnSpPr/>
           <p:nvPr/>
         </p:nvCxnSpPr>
         <p:spPr>
           <a:xfrm>
-            <a:off x="1008484" y="651519"/>
+            <a:off x="1008484" y="457336"/>
             <a:ext cx="1440160" cy="0"/>
           </a:xfrm>
           <a:prstGeom prst="straightConnector1">
@@ -3138,13 +3106,13 @@
       </p:cxnSp>
       <p:sp>
         <p:nvSpPr>
-          <p:cNvPr id="31" name="TextBox 30"/>
+          <p:cNvPr id="23" name="TextBox 22"/>
           <p:cNvSpPr txBox="1"/>
           <p:nvPr/>
         </p:nvSpPr>
         <p:spPr>
           <a:xfrm>
-            <a:off x="936476" y="795535"/>
+            <a:off x="936476" y="601352"/>
             <a:ext cx="1621929" cy="449818"/>
           </a:xfrm>
           <a:prstGeom prst="rect">
@@ -3166,122 +3134,9 @@
           </a:p>
         </p:txBody>
       </p:sp>
-      <p:sp>
-        <p:nvSpPr>
-          <p:cNvPr id="33" name="Rectangular Callout 32"/>
-          <p:cNvSpPr/>
-          <p:nvPr/>
-        </p:nvSpPr>
-        <p:spPr>
-          <a:xfrm>
-            <a:off x="5753805" y="53700"/>
-            <a:ext cx="1663391" cy="669827"/>
-          </a:xfrm>
-          <a:prstGeom prst="wedgeRectCallout">
-            <a:avLst/>
-          </a:prstGeom>
-          <a:solidFill>
-            <a:srgbClr val="FFFFAF"/>
-          </a:solidFill>
-          <a:ln w="12700">
-            <a:solidFill>
-              <a:srgbClr val="FF0000"/>
-            </a:solidFill>
-          </a:ln>
-        </p:spPr>
-        <p:style>
-          <a:lnRef idx="2">
-            <a:schemeClr val="accent1">
-              <a:shade val="50000"/>
-            </a:schemeClr>
-          </a:lnRef>
-          <a:fillRef idx="1">
-            <a:schemeClr val="accent1"/>
-          </a:fillRef>
-          <a:effectRef idx="0">
-            <a:schemeClr val="accent1"/>
-          </a:effectRef>
-          <a:fontRef idx="minor">
-            <a:schemeClr val="lt1"/>
-          </a:fontRef>
-        </p:style>
-        <p:txBody>
-          <a:bodyPr lIns="79708" tIns="39854" rIns="79708" bIns="39854" rtlCol="0" anchor="ctr"/>
-          <a:lstStyle/>
-          <a:p>
-            <a:pPr algn="ctr"/>
-            <a:endParaRPr lang="en-SG"/>
-          </a:p>
-        </p:txBody>
-      </p:sp>
-      <p:sp>
-        <p:nvSpPr>
-          <p:cNvPr id="34" name="TextBox 33"/>
-          <p:cNvSpPr txBox="1"/>
-          <p:nvPr/>
-        </p:nvSpPr>
-        <p:spPr>
-          <a:xfrm>
-            <a:off x="5833020" y="75455"/>
-            <a:ext cx="1704132" cy="634484"/>
-          </a:xfrm>
-          <a:prstGeom prst="rect">
-            <a:avLst/>
-          </a:prstGeom>
-          <a:noFill/>
-        </p:spPr>
-        <p:txBody>
-          <a:bodyPr wrap="square" lIns="79708" tIns="39854" rIns="79708" bIns="39854" rtlCol="0">
-            <a:spAutoFit/>
-          </a:bodyPr>
-          <a:lstStyle/>
-          <a:p>
-            <a:r>
-              <a:rPr lang="en-US" sz="1200" dirty="0"/>
-              <a:t>Easily </a:t>
-            </a:r>
-            <a:r>
-              <a:rPr lang="en-US" sz="1200" b="1" dirty="0" smtClean="0"/>
-              <a:t>copy-paste</a:t>
-            </a:r>
-            <a:r>
-              <a:rPr lang="en-US" sz="1200" dirty="0" smtClean="0"/>
-              <a:t> </a:t>
-            </a:r>
-            <a:r>
-              <a:rPr lang="en-US" sz="1200" dirty="0"/>
-              <a:t>your student data from </a:t>
-            </a:r>
-            <a:r>
-              <a:rPr lang="en-US" sz="1200" dirty="0" smtClean="0"/>
-              <a:t/>
-            </a:r>
-            <a:br>
-              <a:rPr lang="en-US" sz="1200" dirty="0" smtClean="0"/>
-            </a:br>
-            <a:r>
-              <a:rPr lang="en-US" sz="1200" b="1" dirty="0" smtClean="0"/>
-              <a:t>Excel</a:t>
-            </a:r>
-            <a:r>
-              <a:rPr lang="en-US" sz="1200" dirty="0" smtClean="0"/>
-              <a:t> </a:t>
-            </a:r>
-            <a:r>
-              <a:rPr lang="en-US" sz="1200" b="1" dirty="0"/>
-              <a:t>spreadsheets</a:t>
-            </a:r>
-            <a:r>
-              <a:rPr lang="en-US" sz="1200" dirty="0"/>
-              <a:t>!</a:t>
-            </a:r>
-            <a:endParaRPr lang="en-SG" sz="1200" dirty="0"/>
-          </a:p>
-        </p:txBody>
-      </p:sp>
       <p:grpSp>
         <p:nvGrpSpPr>
-          <p:cNvPr id="10" name="Group 9"/>
+          <p:cNvPr id="24" name="Group 23"/>
           <p:cNvGrpSpPr>
             <a:grpSpLocks noChangeAspect="1"/>
           </p:cNvGrpSpPr>
@@ -3289,7 +3144,7 @@
         </p:nvGrpSpPr>
         <p:grpSpPr>
           <a:xfrm>
-            <a:off x="384643" y="324371"/>
+            <a:off x="384643" y="130188"/>
             <a:ext cx="364763" cy="635048"/>
             <a:chOff x="638861" y="309422"/>
             <a:chExt cx="298983" cy="520531"/>
@@ -3297,7 +3152,7 @@
         </p:grpSpPr>
         <p:sp>
           <p:nvSpPr>
-            <p:cNvPr id="12" name="Flowchart: Connector 11"/>
+            <p:cNvPr id="25" name="Flowchart: Connector 24"/>
             <p:cNvSpPr/>
             <p:nvPr/>
           </p:nvSpPr>
@@ -3340,7 +3195,7 @@
         </p:sp>
         <p:grpSp>
           <p:nvGrpSpPr>
-            <p:cNvPr id="13" name="Group 12"/>
+            <p:cNvPr id="26" name="Group 25"/>
             <p:cNvGrpSpPr/>
             <p:nvPr/>
           </p:nvGrpSpPr>
@@ -3354,7 +3209,7 @@
           </p:grpSpPr>
           <p:sp>
             <p:nvSpPr>
-              <p:cNvPr id="16" name="Flowchart: Delay 15"/>
+              <p:cNvPr id="29" name="Flowchart: Delay 28"/>
               <p:cNvSpPr/>
               <p:nvPr/>
             </p:nvSpPr>
@@ -3397,7 +3252,7 @@
           </p:sp>
           <p:sp>
             <p:nvSpPr>
-              <p:cNvPr id="17" name="Freeform 16"/>
+              <p:cNvPr id="32" name="Freeform 31"/>
               <p:cNvSpPr/>
               <p:nvPr/>
             </p:nvSpPr>
@@ -3492,7 +3347,7 @@
         </p:grpSp>
         <p:sp>
           <p:nvSpPr>
-            <p:cNvPr id="14" name="Freeform 13"/>
+            <p:cNvPr id="27" name="Freeform 26"/>
             <p:cNvSpPr/>
             <p:nvPr/>
           </p:nvSpPr>
@@ -3601,7 +3456,7 @@
         </p:sp>
         <p:sp>
           <p:nvSpPr>
-            <p:cNvPr id="15" name="Flowchart: Connector 14"/>
+            <p:cNvPr id="28" name="Flowchart: Connector 27"/>
             <p:cNvSpPr/>
             <p:nvPr/>
           </p:nvSpPr>
@@ -3652,15 +3507,24 @@
       </p:grpSp>
       <p:pic>
         <p:nvPicPr>
-          <p:cNvPr id="1028" name="Picture 4"/>
+          <p:cNvPr id="36" name="Picture 4"/>
           <p:cNvPicPr>
             <a:picLocks noChangeAspect="1" noChangeArrowheads="1"/>
           </p:cNvPicPr>
           <p:nvPr/>
         </p:nvPicPr>
         <p:blipFill>
-          <a:blip r:embed="rId3">
+          <a:blip r:embed="rId2">
             <a:extLst>
+              <a:ext uri="{BEBA8EAE-BF5A-486C-A8C5-ECC9F3942E4B}">
+                <a14:imgProps xmlns:a14="http://schemas.microsoft.com/office/drawing/2010/main">
+                  <a14:imgLayer r:embed="rId3">
+                    <a14:imgEffect>
+                      <a14:saturation sat="0"/>
+                    </a14:imgEffect>
+                  </a14:imgLayer>
+                </a14:imgProps>
+              </a:ext>
               <a:ext uri="{28A0092B-C50C-407E-A947-70E740481C1C}">
                 <a14:useLocalDpi xmlns:a14="http://schemas.microsoft.com/office/drawing/2010/main" val="0"/>
               </a:ext>
@@ -3673,30 +3537,16 @@
         </p:blipFill>
         <p:spPr bwMode="auto">
           <a:xfrm>
-            <a:off x="4104828" y="1011378"/>
-            <a:ext cx="2976388" cy="1378378"/>
+            <a:off x="2438844" y="79818"/>
+            <a:ext cx="4339247" cy="1265255"/>
           </a:xfrm>
           <a:prstGeom prst="rect">
             <a:avLst/>
           </a:prstGeom>
           <a:noFill/>
-          <a:ln w="9525">
-            <a:solidFill>
-              <a:schemeClr val="bg1">
-                <a:lumMod val="85000"/>
-              </a:schemeClr>
-            </a:solidFill>
-            <a:miter lim="800000"/>
-            <a:headEnd/>
-            <a:tailEnd/>
+          <a:ln>
+            <a:noFill/>
           </a:ln>
-          <a:effectLst>
-            <a:outerShdw blurRad="63500" sx="102000" sy="102000" algn="ctr" rotWithShape="0">
-              <a:prstClr val="black">
-                <a:alpha val="40000"/>
-              </a:prstClr>
-            </a:outerShdw>
-          </a:effectLst>
           <a:extLst>
             <a:ext uri="{909E8E84-426E-40DD-AFC4-6F175D3DCCD1}">
               <a14:hiddenFill xmlns:a14="http://schemas.microsoft.com/office/drawing/2010/main">
@@ -3715,27 +3565,306 @@
                 <a:tailEnd/>
               </a14:hiddenLine>
             </a:ext>
-            <a:ext uri="{AF507438-7753-43E0-B8FC-AC1667EBCBE1}">
-              <a14:hiddenEffects xmlns:a14="http://schemas.microsoft.com/office/drawing/2010/main">
-                <a:effectLst>
-                  <a:outerShdw dist="35921" dir="2700000" algn="ctr" rotWithShape="0">
-                    <a:schemeClr val="bg2"/>
-                  </a:outerShdw>
-                </a:effectLst>
-              </a14:hiddenEffects>
+          </a:extLst>
+        </p:spPr>
+      </p:pic>
+      <p:sp>
+        <p:nvSpPr>
+          <p:cNvPr id="37" name="TextBox 36"/>
+          <p:cNvSpPr txBox="1"/>
+          <p:nvPr/>
+        </p:nvSpPr>
+        <p:spPr>
+          <a:xfrm>
+            <a:off x="3208437" y="204471"/>
+            <a:ext cx="3513332" cy="1169551"/>
+          </a:xfrm>
+          <a:prstGeom prst="rect">
+            <a:avLst/>
+          </a:prstGeom>
+          <a:noFill/>
+        </p:spPr>
+        <p:txBody>
+          <a:bodyPr wrap="square" rtlCol="0">
+            <a:spAutoFit/>
+          </a:bodyPr>
+          <a:lstStyle/>
+          <a:p>
+            <a:r>
+              <a:rPr lang="en-US" sz="1000" b="1" dirty="0" smtClean="0">
+                <a:solidFill>
+                  <a:schemeClr val="tx2">
+                    <a:lumMod val="60000"/>
+                    <a:lumOff val="40000"/>
+                  </a:schemeClr>
+                </a:solidFill>
+                <a:latin typeface="Consolas" panose="020B0609020204030204" pitchFamily="49" charset="0"/>
+                <a:cs typeface="Consolas" panose="020B0609020204030204" pitchFamily="49" charset="0"/>
+              </a:rPr>
+              <a:t>Team    Name         Email             Comments</a:t>
+            </a:r>
+          </a:p>
+          <a:p>
+            <a:r>
+              <a:rPr lang="en-SG" sz="1000" dirty="0" smtClean="0">
+                <a:solidFill>
+                  <a:schemeClr val="tx2">
+                    <a:lumMod val="60000"/>
+                    <a:lumOff val="40000"/>
+                  </a:schemeClr>
+                </a:solidFill>
+                <a:latin typeface="Consolas" panose="020B0609020204030204" pitchFamily="49" charset="0"/>
+                <a:cs typeface="Consolas" panose="020B0609020204030204" pitchFamily="49" charset="0"/>
+              </a:rPr>
+              <a:t>Team 1  Tom Jacobs   tom@email.com	</a:t>
+            </a:r>
+          </a:p>
+          <a:p>
+            <a:r>
+              <a:rPr lang="en-SG" sz="1000" dirty="0" smtClean="0">
+                <a:solidFill>
+                  <a:schemeClr val="tx2">
+                    <a:lumMod val="60000"/>
+                    <a:lumOff val="40000"/>
+                  </a:schemeClr>
+                </a:solidFill>
+                <a:latin typeface="Consolas" panose="020B0609020204030204" pitchFamily="49" charset="0"/>
+                <a:cs typeface="Consolas" panose="020B0609020204030204" pitchFamily="49" charset="0"/>
+              </a:rPr>
+              <a:t>Team 1  Jean Wong    jean@email.com    Exchange</a:t>
+            </a:r>
+          </a:p>
+          <a:p>
+            <a:r>
+              <a:rPr lang="en-SG" sz="1000" dirty="0" smtClean="0">
+                <a:solidFill>
+                  <a:schemeClr val="tx2">
+                    <a:lumMod val="60000"/>
+                    <a:lumOff val="40000"/>
+                  </a:schemeClr>
+                </a:solidFill>
+                <a:latin typeface="Consolas" panose="020B0609020204030204" pitchFamily="49" charset="0"/>
+                <a:cs typeface="Consolas" panose="020B0609020204030204" pitchFamily="49" charset="0"/>
+              </a:rPr>
+              <a:t>Team 1  Ravi Kumar   ravi@email.com	</a:t>
+            </a:r>
+          </a:p>
+          <a:p>
+            <a:r>
+              <a:rPr lang="en-SG" sz="1000" dirty="0" smtClean="0">
+                <a:solidFill>
+                  <a:schemeClr val="tx2">
+                    <a:lumMod val="60000"/>
+                    <a:lumOff val="40000"/>
+                  </a:schemeClr>
+                </a:solidFill>
+                <a:latin typeface="Consolas" panose="020B0609020204030204" pitchFamily="49" charset="0"/>
+                <a:cs typeface="Consolas" panose="020B0609020204030204" pitchFamily="49" charset="0"/>
+              </a:rPr>
+              <a:t>Team 2  Chun Ling    ling@coolmai.com</a:t>
+            </a:r>
+            <a:r>
+              <a:rPr lang="en-SG" sz="1000" dirty="0">
+                <a:solidFill>
+                  <a:schemeClr val="tx2">
+                    <a:lumMod val="60000"/>
+                    <a:lumOff val="40000"/>
+                  </a:schemeClr>
+                </a:solidFill>
+                <a:latin typeface="Consolas" panose="020B0609020204030204" pitchFamily="49" charset="0"/>
+                <a:cs typeface="Consolas" panose="020B0609020204030204" pitchFamily="49" charset="0"/>
+              </a:rPr>
+              <a:t>	</a:t>
+            </a:r>
+          </a:p>
+          <a:p>
+            <a:r>
+              <a:rPr lang="en-SG" sz="1000" dirty="0">
+                <a:solidFill>
+                  <a:schemeClr val="tx2">
+                    <a:lumMod val="60000"/>
+                    <a:lumOff val="40000"/>
+                  </a:schemeClr>
+                </a:solidFill>
+                <a:latin typeface="Consolas" panose="020B0609020204030204" pitchFamily="49" charset="0"/>
+                <a:cs typeface="Consolas" panose="020B0609020204030204" pitchFamily="49" charset="0"/>
+              </a:rPr>
+              <a:t>Team </a:t>
+            </a:r>
+            <a:r>
+              <a:rPr lang="en-SG" sz="1000" dirty="0" smtClean="0">
+                <a:solidFill>
+                  <a:schemeClr val="tx2">
+                    <a:lumMod val="60000"/>
+                    <a:lumOff val="40000"/>
+                  </a:schemeClr>
+                </a:solidFill>
+                <a:latin typeface="Consolas" panose="020B0609020204030204" pitchFamily="49" charset="0"/>
+                <a:cs typeface="Consolas" panose="020B0609020204030204" pitchFamily="49" charset="0"/>
+              </a:rPr>
+              <a:t>2  Desmond Wu   desmond@email.com</a:t>
+            </a:r>
+          </a:p>
+          <a:p>
+            <a:r>
+              <a:rPr lang="en-US" sz="1000" dirty="0" smtClean="0">
+                <a:solidFill>
+                  <a:schemeClr val="tx2">
+                    <a:lumMod val="60000"/>
+                    <a:lumOff val="40000"/>
+                  </a:schemeClr>
+                </a:solidFill>
+                <a:latin typeface="Consolas" panose="020B0609020204030204" pitchFamily="49" charset="0"/>
+                <a:cs typeface="Consolas" panose="020B0609020204030204" pitchFamily="49" charset="0"/>
+              </a:rPr>
+              <a:t>Team 2  </a:t>
+            </a:r>
+            <a:r>
+              <a:rPr lang="en-US" sz="1000" dirty="0" err="1" smtClean="0">
+                <a:solidFill>
+                  <a:schemeClr val="tx2">
+                    <a:lumMod val="60000"/>
+                    <a:lumOff val="40000"/>
+                  </a:schemeClr>
+                </a:solidFill>
+                <a:latin typeface="Consolas" panose="020B0609020204030204" pitchFamily="49" charset="0"/>
+                <a:cs typeface="Consolas" panose="020B0609020204030204" pitchFamily="49" charset="0"/>
+              </a:rPr>
+              <a:t>Harsha</a:t>
+            </a:r>
+            <a:r>
+              <a:rPr lang="en-US" sz="1000" dirty="0" smtClean="0">
+                <a:solidFill>
+                  <a:schemeClr val="tx2">
+                    <a:lumMod val="60000"/>
+                    <a:lumOff val="40000"/>
+                  </a:schemeClr>
+                </a:solidFill>
+                <a:latin typeface="Consolas" panose="020B0609020204030204" pitchFamily="49" charset="0"/>
+                <a:cs typeface="Consolas" panose="020B0609020204030204" pitchFamily="49" charset="0"/>
+              </a:rPr>
+              <a:t> Silva harsha@school.com</a:t>
+            </a:r>
+            <a:endParaRPr lang="en-SG" sz="1000" dirty="0">
+              <a:solidFill>
+                <a:schemeClr val="tx2">
+                  <a:lumMod val="60000"/>
+                  <a:lumOff val="40000"/>
+                </a:schemeClr>
+              </a:solidFill>
+              <a:latin typeface="Consolas" panose="020B0609020204030204" pitchFamily="49" charset="0"/>
+              <a:cs typeface="Consolas" panose="020B0609020204030204" pitchFamily="49" charset="0"/>
+            </a:endParaRPr>
+          </a:p>
+        </p:txBody>
+      </p:sp>
+      <p:sp>
+        <p:nvSpPr>
+          <p:cNvPr id="38" name="Rectangle 37"/>
+          <p:cNvSpPr/>
+          <p:nvPr/>
+        </p:nvSpPr>
+        <p:spPr>
+          <a:xfrm>
+            <a:off x="5707793" y="1381534"/>
+            <a:ext cx="76200" cy="142875"/>
+          </a:xfrm>
+          <a:prstGeom prst="rect">
+            <a:avLst/>
+          </a:prstGeom>
+          <a:noFill/>
+          <a:ln>
+            <a:noFill/>
+          </a:ln>
+        </p:spPr>
+        <p:style>
+          <a:lnRef idx="2">
+            <a:schemeClr val="accent1">
+              <a:shade val="50000"/>
+            </a:schemeClr>
+          </a:lnRef>
+          <a:fillRef idx="1">
+            <a:schemeClr val="accent1"/>
+          </a:fillRef>
+          <a:effectRef idx="0">
+            <a:schemeClr val="accent1"/>
+          </a:effectRef>
+          <a:fontRef idx="minor">
+            <a:schemeClr val="lt1"/>
+          </a:fontRef>
+        </p:style>
+        <p:txBody>
+          <a:bodyPr rtlCol="0" anchor="ctr"/>
+          <a:lstStyle/>
+          <a:p>
+            <a:pPr algn="ctr"/>
+            <a:endParaRPr lang="en-SG"/>
+          </a:p>
+        </p:txBody>
+      </p:sp>
+      <p:pic>
+        <p:nvPicPr>
+          <p:cNvPr id="39" name="Picture 9"/>
+          <p:cNvPicPr>
+            <a:picLocks noChangeAspect="1" noChangeArrowheads="1"/>
+          </p:cNvPicPr>
+          <p:nvPr/>
+        </p:nvPicPr>
+        <p:blipFill>
+          <a:blip r:embed="rId4">
+            <a:extLst>
+              <a:ext uri="{28A0092B-C50C-407E-A947-70E740481C1C}">
+                <a14:useLocalDpi xmlns:a14="http://schemas.microsoft.com/office/drawing/2010/main" val="0"/>
+              </a:ext>
+            </a:extLst>
+          </a:blip>
+          <a:srcRect/>
+          <a:stretch>
+            <a:fillRect/>
+          </a:stretch>
+        </p:blipFill>
+        <p:spPr bwMode="auto">
+          <a:xfrm>
+            <a:off x="4195173" y="1016800"/>
+            <a:ext cx="3384376" cy="1284741"/>
+          </a:xfrm>
+          <a:prstGeom prst="rect">
+            <a:avLst/>
+          </a:prstGeom>
+          <a:noFill/>
+          <a:ln>
+            <a:noFill/>
+          </a:ln>
+          <a:extLst>
+            <a:ext uri="{909E8E84-426E-40DD-AFC4-6F175D3DCCD1}">
+              <a14:hiddenFill xmlns:a14="http://schemas.microsoft.com/office/drawing/2010/main">
+                <a:solidFill>
+                  <a:schemeClr val="accent1"/>
+                </a:solidFill>
+              </a14:hiddenFill>
+            </a:ext>
+            <a:ext uri="{91240B29-F687-4F45-9708-019B960494DF}">
+              <a14:hiddenLine xmlns:a14="http://schemas.microsoft.com/office/drawing/2010/main" w="9525">
+                <a:solidFill>
+                  <a:schemeClr val="tx1"/>
+                </a:solidFill>
+                <a:miter lim="800000"/>
+                <a:headEnd/>
+                <a:tailEnd/>
+              </a14:hiddenLine>
             </a:ext>
           </a:extLst>
         </p:spPr>
       </p:pic>
       <p:sp>
         <p:nvSpPr>
-          <p:cNvPr id="35" name="Curved Left Arrow 34"/>
+          <p:cNvPr id="40" name="Curved Left Arrow 39"/>
           <p:cNvSpPr/>
           <p:nvPr/>
         </p:nvSpPr>
         <p:spPr>
           <a:xfrm rot="8593321">
-            <a:off x="3844945" y="1329586"/>
+            <a:off x="3844945" y="1135403"/>
             <a:ext cx="249528" cy="419340"/>
           </a:xfrm>
           <a:prstGeom prst="curvedLeftArrow">
@@ -3769,6 +3898,119 @@
                 <a:schemeClr val="tx1"/>
               </a:solidFill>
             </a:endParaRPr>
+          </a:p>
+        </p:txBody>
+      </p:sp>
+      <p:sp>
+        <p:nvSpPr>
+          <p:cNvPr id="41" name="Rectangular Callout 40"/>
+          <p:cNvSpPr/>
+          <p:nvPr/>
+        </p:nvSpPr>
+        <p:spPr>
+          <a:xfrm>
+            <a:off x="5753805" y="36425"/>
+            <a:ext cx="1663391" cy="669827"/>
+          </a:xfrm>
+          <a:prstGeom prst="wedgeRectCallout">
+            <a:avLst/>
+          </a:prstGeom>
+          <a:solidFill>
+            <a:srgbClr val="FFFFAF"/>
+          </a:solidFill>
+          <a:ln w="12700">
+            <a:solidFill>
+              <a:srgbClr val="FF0000"/>
+            </a:solidFill>
+          </a:ln>
+        </p:spPr>
+        <p:style>
+          <a:lnRef idx="2">
+            <a:schemeClr val="accent1">
+              <a:shade val="50000"/>
+            </a:schemeClr>
+          </a:lnRef>
+          <a:fillRef idx="1">
+            <a:schemeClr val="accent1"/>
+          </a:fillRef>
+          <a:effectRef idx="0">
+            <a:schemeClr val="accent1"/>
+          </a:effectRef>
+          <a:fontRef idx="minor">
+            <a:schemeClr val="lt1"/>
+          </a:fontRef>
+        </p:style>
+        <p:txBody>
+          <a:bodyPr lIns="79708" tIns="39854" rIns="79708" bIns="39854" rtlCol="0" anchor="ctr"/>
+          <a:lstStyle/>
+          <a:p>
+            <a:pPr algn="ctr"/>
+            <a:endParaRPr lang="en-SG"/>
+          </a:p>
+        </p:txBody>
+      </p:sp>
+      <p:sp>
+        <p:nvSpPr>
+          <p:cNvPr id="42" name="TextBox 41"/>
+          <p:cNvSpPr txBox="1"/>
+          <p:nvPr/>
+        </p:nvSpPr>
+        <p:spPr>
+          <a:xfrm>
+            <a:off x="5833020" y="58180"/>
+            <a:ext cx="1704132" cy="634484"/>
+          </a:xfrm>
+          <a:prstGeom prst="rect">
+            <a:avLst/>
+          </a:prstGeom>
+          <a:noFill/>
+        </p:spPr>
+        <p:txBody>
+          <a:bodyPr wrap="square" lIns="79708" tIns="39854" rIns="79708" bIns="39854" rtlCol="0">
+            <a:spAutoFit/>
+          </a:bodyPr>
+          <a:lstStyle/>
+          <a:p>
+            <a:r>
+              <a:rPr lang="en-US" sz="1200" dirty="0"/>
+              <a:t>Easily </a:t>
+            </a:r>
+            <a:r>
+              <a:rPr lang="en-US" sz="1200" b="1" dirty="0" smtClean="0"/>
+              <a:t>copy-paste</a:t>
+            </a:r>
+            <a:r>
+              <a:rPr lang="en-US" sz="1200" dirty="0" smtClean="0"/>
+              <a:t> </a:t>
+            </a:r>
+            <a:r>
+              <a:rPr lang="en-US" sz="1200" dirty="0"/>
+              <a:t>your student data from </a:t>
+            </a:r>
+            <a:r>
+              <a:rPr lang="en-US" sz="1200" dirty="0" smtClean="0"/>
+              <a:t/>
+            </a:r>
+            <a:br>
+              <a:rPr lang="en-US" sz="1200" dirty="0" smtClean="0"/>
+            </a:br>
+            <a:r>
+              <a:rPr lang="en-US" sz="1200" b="1" dirty="0" smtClean="0"/>
+              <a:t>Excel</a:t>
+            </a:r>
+            <a:r>
+              <a:rPr lang="en-US" sz="1200" dirty="0" smtClean="0"/>
+              <a:t> </a:t>
+            </a:r>
+            <a:r>
+              <a:rPr lang="en-US" sz="1200" b="1" dirty="0"/>
+              <a:t>spreadsheets</a:t>
+            </a:r>
+            <a:r>
+              <a:rPr lang="en-US" sz="1200" dirty="0"/>
+              <a:t>!</a:t>
+            </a:r>
+            <a:endParaRPr lang="en-SG" sz="1200" dirty="0"/>
           </a:p>
         </p:txBody>
       </p:sp>

</xml_diff>